<commit_message>
Done with W4S2 and W4S3 materials.
</commit_message>
<xml_diff>
--- a/W4/3. W4S3 final/W4S3.pptx
+++ b/W4/3. W4S3 final/W4S3.pptx
@@ -304,7 +304,6 @@
 <p1510:revInfo xmlns:a="http://schemas.openxmlformats.org/drawingml/2006/main" xmlns:r="http://schemas.openxmlformats.org/officeDocument/2006/relationships" xmlns:p1510="http://schemas.microsoft.com/office/powerpoint/2015/10/main">
   <p1510:revLst>
     <p1510:client id="{3EBEA09A-C8F2-4F70-B6ED-0EC0AD642829}" v="5" dt="2023-02-13T08:00:24.504"/>
-    <p1510:client id="{556C7E6E-9ED7-4F9D-9E55-43EB46A53FAD}" v="4358" dt="2023-02-13T07:20:19.420"/>
   </p1510:revLst>
 </p1510:revInfo>
 </file>
@@ -7512,7 +7511,7 @@
   <pc:docChgLst>
     <pc:chgData name="Matthieu De Mari" userId="dfb708c9-d8dc-439f-9a3b-c772bf4a311c" providerId="ADAL" clId="{3EBEA09A-C8F2-4F70-B6ED-0EC0AD642829}"/>
     <pc:docChg chg="custSel addSld delSld modSld sldOrd delSection modSection">
-      <pc:chgData name="Matthieu De Mari" userId="dfb708c9-d8dc-439f-9a3b-c772bf4a311c" providerId="ADAL" clId="{3EBEA09A-C8F2-4F70-B6ED-0EC0AD642829}" dt="2023-02-13T08:00:24.502" v="598" actId="20577"/>
+      <pc:chgData name="Matthieu De Mari" userId="dfb708c9-d8dc-439f-9a3b-c772bf4a311c" providerId="ADAL" clId="{3EBEA09A-C8F2-4F70-B6ED-0EC0AD642829}" dt="2023-02-15T02:51:29.880" v="599"/>
       <pc:docMkLst>
         <pc:docMk/>
       </pc:docMkLst>
@@ -7707,6 +7706,21 @@
           <pc:docMk/>
           <pc:sldMk cId="392272370" sldId="398"/>
         </pc:sldMkLst>
+      </pc:sldChg>
+      <pc:sldChg chg="modSp mod">
+        <pc:chgData name="Matthieu De Mari" userId="dfb708c9-d8dc-439f-9a3b-c772bf4a311c" providerId="ADAL" clId="{3EBEA09A-C8F2-4F70-B6ED-0EC0AD642829}" dt="2023-02-15T02:51:29.880" v="599"/>
+        <pc:sldMkLst>
+          <pc:docMk/>
+          <pc:sldMk cId="1994190645" sldId="404"/>
+        </pc:sldMkLst>
+        <pc:spChg chg="mod">
+          <ac:chgData name="Matthieu De Mari" userId="dfb708c9-d8dc-439f-9a3b-c772bf4a311c" providerId="ADAL" clId="{3EBEA09A-C8F2-4F70-B6ED-0EC0AD642829}" dt="2023-02-15T02:51:29.880" v="599"/>
+          <ac:spMkLst>
+            <pc:docMk/>
+            <pc:sldMk cId="1994190645" sldId="404"/>
+            <ac:spMk id="3" creationId="{D88A53A5-2211-49ED-A3B9-63024343A178}"/>
+          </ac:spMkLst>
+        </pc:spChg>
       </pc:sldChg>
       <pc:sldChg chg="modSp mod">
         <pc:chgData name="Matthieu De Mari" userId="dfb708c9-d8dc-439f-9a3b-c772bf4a311c" providerId="ADAL" clId="{3EBEA09A-C8F2-4F70-B6ED-0EC0AD642829}" dt="2023-02-13T07:41:19.253" v="43" actId="115"/>
@@ -8438,7 +8452,7 @@
           <a:p>
             <a:fld id="{61478373-EB31-4867-8CF0-FA31364748A5}" type="datetimeFigureOut">
               <a:rPr lang="en-GB" smtClean="0"/>
-              <a:t>13/02/2023</a:t>
+              <a:t>15/02/2023</a:t>
             </a:fld>
             <a:endParaRPr lang="en-GB"/>
           </a:p>
@@ -8855,7 +8869,7 @@
           <a:p>
             <a:fld id="{E85DF616-B21E-4EF6-A6A5-95E2FB3EB1A1}" type="datetimeFigureOut">
               <a:rPr lang="en-GB" smtClean="0"/>
-              <a:t>13/02/2023</a:t>
+              <a:t>15/02/2023</a:t>
             </a:fld>
             <a:endParaRPr lang="en-GB"/>
           </a:p>
@@ -9055,7 +9069,7 @@
           <a:p>
             <a:fld id="{E85DF616-B21E-4EF6-A6A5-95E2FB3EB1A1}" type="datetimeFigureOut">
               <a:rPr lang="en-GB" smtClean="0"/>
-              <a:t>13/02/2023</a:t>
+              <a:t>15/02/2023</a:t>
             </a:fld>
             <a:endParaRPr lang="en-GB"/>
           </a:p>
@@ -9265,7 +9279,7 @@
           <a:p>
             <a:fld id="{E85DF616-B21E-4EF6-A6A5-95E2FB3EB1A1}" type="datetimeFigureOut">
               <a:rPr lang="en-GB" smtClean="0"/>
-              <a:t>13/02/2023</a:t>
+              <a:t>15/02/2023</a:t>
             </a:fld>
             <a:endParaRPr lang="en-GB"/>
           </a:p>
@@ -9465,7 +9479,7 @@
           <a:p>
             <a:fld id="{E85DF616-B21E-4EF6-A6A5-95E2FB3EB1A1}" type="datetimeFigureOut">
               <a:rPr lang="en-GB" smtClean="0"/>
-              <a:t>13/02/2023</a:t>
+              <a:t>15/02/2023</a:t>
             </a:fld>
             <a:endParaRPr lang="en-GB"/>
           </a:p>
@@ -9741,7 +9755,7 @@
           <a:p>
             <a:fld id="{E85DF616-B21E-4EF6-A6A5-95E2FB3EB1A1}" type="datetimeFigureOut">
               <a:rPr lang="en-GB" smtClean="0"/>
-              <a:t>13/02/2023</a:t>
+              <a:t>15/02/2023</a:t>
             </a:fld>
             <a:endParaRPr lang="en-GB"/>
           </a:p>
@@ -10009,7 +10023,7 @@
           <a:p>
             <a:fld id="{E85DF616-B21E-4EF6-A6A5-95E2FB3EB1A1}" type="datetimeFigureOut">
               <a:rPr lang="en-GB" smtClean="0"/>
-              <a:t>13/02/2023</a:t>
+              <a:t>15/02/2023</a:t>
             </a:fld>
             <a:endParaRPr lang="en-GB"/>
           </a:p>
@@ -10424,7 +10438,7 @@
           <a:p>
             <a:fld id="{E85DF616-B21E-4EF6-A6A5-95E2FB3EB1A1}" type="datetimeFigureOut">
               <a:rPr lang="en-GB" smtClean="0"/>
-              <a:t>13/02/2023</a:t>
+              <a:t>15/02/2023</a:t>
             </a:fld>
             <a:endParaRPr lang="en-GB"/>
           </a:p>
@@ -10566,7 +10580,7 @@
           <a:p>
             <a:fld id="{E85DF616-B21E-4EF6-A6A5-95E2FB3EB1A1}" type="datetimeFigureOut">
               <a:rPr lang="en-GB" smtClean="0"/>
-              <a:t>13/02/2023</a:t>
+              <a:t>15/02/2023</a:t>
             </a:fld>
             <a:endParaRPr lang="en-GB"/>
           </a:p>
@@ -10679,7 +10693,7 @@
           <a:p>
             <a:fld id="{E85DF616-B21E-4EF6-A6A5-95E2FB3EB1A1}" type="datetimeFigureOut">
               <a:rPr lang="en-GB" smtClean="0"/>
-              <a:t>13/02/2023</a:t>
+              <a:t>15/02/2023</a:t>
             </a:fld>
             <a:endParaRPr lang="en-GB"/>
           </a:p>
@@ -10992,7 +11006,7 @@
           <a:p>
             <a:fld id="{E85DF616-B21E-4EF6-A6A5-95E2FB3EB1A1}" type="datetimeFigureOut">
               <a:rPr lang="en-GB" smtClean="0"/>
-              <a:t>13/02/2023</a:t>
+              <a:t>15/02/2023</a:t>
             </a:fld>
             <a:endParaRPr lang="en-GB"/>
           </a:p>
@@ -11281,7 +11295,7 @@
           <a:p>
             <a:fld id="{E85DF616-B21E-4EF6-A6A5-95E2FB3EB1A1}" type="datetimeFigureOut">
               <a:rPr lang="en-GB" smtClean="0"/>
-              <a:t>13/02/2023</a:t>
+              <a:t>15/02/2023</a:t>
             </a:fld>
             <a:endParaRPr lang="en-GB"/>
           </a:p>
@@ -11524,7 +11538,7 @@
           <a:p>
             <a:fld id="{E85DF616-B21E-4EF6-A6A5-95E2FB3EB1A1}" type="datetimeFigureOut">
               <a:rPr lang="en-GB" smtClean="0"/>
-              <a:t>13/02/2023</a:t>
+              <a:t>15/02/2023</a:t>
             </a:fld>
             <a:endParaRPr lang="en-GB"/>
           </a:p>
@@ -13924,8 +13938,13 @@
             </a:r>
             <a:r>
               <a:rPr lang="en-GB" dirty="0"/>
-              <a:t>, but it has several differences that separated it from other models ([]):</a:t>
-            </a:r>
+              <a:t>, but it has several differences that separated it from other </a:t>
+            </a:r>
+            <a:r>
+              <a:rPr lang="en-GB"/>
+              <a:t>models ([Simonyan2014]):</a:t>
+            </a:r>
+            <a:endParaRPr lang="en-GB" dirty="0"/>
           </a:p>
           <a:p>
             <a:r>

</xml_diff>

<commit_message>
Revised materials for Week 4. Adding more visuals and notebooks rework.
</commit_message>
<xml_diff>
--- a/W4/3. W4S3 final/W4S3.pptx
+++ b/W4/3. W4S3 final/W4S3.pptx
@@ -5,7 +5,7 @@
     <p:sldMasterId id="2147483648" r:id="rId1"/>
   </p:sldMasterIdLst>
   <p:notesMasterIdLst>
-    <p:notesMasterId r:id="rId63"/>
+    <p:notesMasterId r:id="rId64"/>
   </p:notesMasterIdLst>
   <p:sldIdLst>
     <p:sldId id="377" r:id="rId2"/>
@@ -53,22 +53,23 @@
     <p:sldId id="608" r:id="rId44"/>
     <p:sldId id="402" r:id="rId45"/>
     <p:sldId id="609" r:id="rId46"/>
-    <p:sldId id="409" r:id="rId47"/>
-    <p:sldId id="610" r:id="rId48"/>
-    <p:sldId id="611" r:id="rId49"/>
-    <p:sldId id="612" r:id="rId50"/>
-    <p:sldId id="613" r:id="rId51"/>
-    <p:sldId id="614" r:id="rId52"/>
-    <p:sldId id="616" r:id="rId53"/>
-    <p:sldId id="617" r:id="rId54"/>
-    <p:sldId id="618" r:id="rId55"/>
-    <p:sldId id="410" r:id="rId56"/>
-    <p:sldId id="346" r:id="rId57"/>
-    <p:sldId id="583" r:id="rId58"/>
-    <p:sldId id="619" r:id="rId59"/>
-    <p:sldId id="584" r:id="rId60"/>
-    <p:sldId id="595" r:id="rId61"/>
-    <p:sldId id="266" r:id="rId62"/>
+    <p:sldId id="622" r:id="rId47"/>
+    <p:sldId id="409" r:id="rId48"/>
+    <p:sldId id="610" r:id="rId49"/>
+    <p:sldId id="611" r:id="rId50"/>
+    <p:sldId id="612" r:id="rId51"/>
+    <p:sldId id="613" r:id="rId52"/>
+    <p:sldId id="614" r:id="rId53"/>
+    <p:sldId id="616" r:id="rId54"/>
+    <p:sldId id="617" r:id="rId55"/>
+    <p:sldId id="618" r:id="rId56"/>
+    <p:sldId id="410" r:id="rId57"/>
+    <p:sldId id="346" r:id="rId58"/>
+    <p:sldId id="583" r:id="rId59"/>
+    <p:sldId id="619" r:id="rId60"/>
+    <p:sldId id="584" r:id="rId61"/>
+    <p:sldId id="595" r:id="rId62"/>
+    <p:sldId id="266" r:id="rId63"/>
   </p:sldIdLst>
   <p:sldSz cx="12192000" cy="6858000"/>
   <p:notesSz cx="6858000" cy="9144000"/>
@@ -257,6 +258,7 @@
           <p14:sldIdLst>
             <p14:sldId id="402"/>
             <p14:sldId id="609"/>
+            <p14:sldId id="622"/>
           </p14:sldIdLst>
         </p14:section>
         <p14:section name="VIII.2. Transfer learning" id="{188080E3-A19A-47FA-BD8E-CCB31168FC46}">
@@ -300,16 +302,55 @@
 </p:presentation>
 </file>
 
-<file path=ppt/revisionInfo.xml><?xml version="1.0" encoding="utf-8"?>
-<p1510:revInfo xmlns:a="http://schemas.openxmlformats.org/drawingml/2006/main" xmlns:r="http://schemas.openxmlformats.org/officeDocument/2006/relationships" xmlns:p1510="http://schemas.microsoft.com/office/powerpoint/2015/10/main">
-  <p1510:revLst>
-    <p1510:client id="{3EBEA09A-C8F2-4F70-B6ED-0EC0AD642829}" v="5" dt="2023-02-13T08:00:24.504"/>
-  </p1510:revLst>
-</p1510:revInfo>
-</file>
-
 <file path=ppt/changesInfos/changesInfo1.xml><?xml version="1.0" encoding="utf-8"?>
 <pc:chgInfo xmlns:a="http://schemas.openxmlformats.org/drawingml/2006/main" xmlns:r="http://schemas.openxmlformats.org/officeDocument/2006/relationships" xmlns:ac="http://schemas.microsoft.com/office/drawing/2013/main/command" xmlns:pc="http://schemas.microsoft.com/office/powerpoint/2013/main/command">
+  <pc:docChgLst>
+    <pc:chgData name="Matthieu De Mari" userId="dfb708c9-d8dc-439f-9a3b-c772bf4a311c" providerId="ADAL" clId="{793B7CF5-4751-4F15-8C6D-9DC161E345B5}"/>
+    <pc:docChg chg="addSld modSld modSection">
+      <pc:chgData name="Matthieu De Mari" userId="dfb708c9-d8dc-439f-9a3b-c772bf4a311c" providerId="ADAL" clId="{793B7CF5-4751-4F15-8C6D-9DC161E345B5}" dt="2023-07-06T06:08:21.395" v="73" actId="1076"/>
+      <pc:docMkLst>
+        <pc:docMk/>
+      </pc:docMkLst>
+      <pc:sldChg chg="modSp mod">
+        <pc:chgData name="Matthieu De Mari" userId="dfb708c9-d8dc-439f-9a3b-c772bf4a311c" providerId="ADAL" clId="{793B7CF5-4751-4F15-8C6D-9DC161E345B5}" dt="2023-07-06T06:07:38.745" v="65" actId="20577"/>
+        <pc:sldMkLst>
+          <pc:docMk/>
+          <pc:sldMk cId="2961155165" sldId="402"/>
+        </pc:sldMkLst>
+        <pc:spChg chg="mod">
+          <ac:chgData name="Matthieu De Mari" userId="dfb708c9-d8dc-439f-9a3b-c772bf4a311c" providerId="ADAL" clId="{793B7CF5-4751-4F15-8C6D-9DC161E345B5}" dt="2023-07-06T06:07:38.745" v="65" actId="20577"/>
+          <ac:spMkLst>
+            <pc:docMk/>
+            <pc:sldMk cId="2961155165" sldId="402"/>
+            <ac:spMk id="3" creationId="{CC15B02E-4FC8-0A0E-E6EB-850476F34791}"/>
+          </ac:spMkLst>
+        </pc:spChg>
+      </pc:sldChg>
+      <pc:sldChg chg="addSp modSp add mod">
+        <pc:chgData name="Matthieu De Mari" userId="dfb708c9-d8dc-439f-9a3b-c772bf4a311c" providerId="ADAL" clId="{793B7CF5-4751-4F15-8C6D-9DC161E345B5}" dt="2023-07-06T06:08:21.395" v="73" actId="1076"/>
+        <pc:sldMkLst>
+          <pc:docMk/>
+          <pc:sldMk cId="3312885661" sldId="622"/>
+        </pc:sldMkLst>
+        <pc:spChg chg="mod">
+          <ac:chgData name="Matthieu De Mari" userId="dfb708c9-d8dc-439f-9a3b-c772bf4a311c" providerId="ADAL" clId="{793B7CF5-4751-4F15-8C6D-9DC161E345B5}" dt="2023-07-06T06:08:11.390" v="67" actId="207"/>
+          <ac:spMkLst>
+            <pc:docMk/>
+            <pc:sldMk cId="3312885661" sldId="622"/>
+            <ac:spMk id="3" creationId="{CC15B02E-4FC8-0A0E-E6EB-850476F34791}"/>
+          </ac:spMkLst>
+        </pc:spChg>
+        <pc:picChg chg="add mod">
+          <ac:chgData name="Matthieu De Mari" userId="dfb708c9-d8dc-439f-9a3b-c772bf4a311c" providerId="ADAL" clId="{793B7CF5-4751-4F15-8C6D-9DC161E345B5}" dt="2023-07-06T06:08:21.395" v="73" actId="1076"/>
+          <ac:picMkLst>
+            <pc:docMk/>
+            <pc:sldMk cId="3312885661" sldId="622"/>
+            <ac:picMk id="5" creationId="{B7A6F6A9-98E7-D934-9F36-C456C5ABDBA8}"/>
+          </ac:picMkLst>
+        </pc:picChg>
+      </pc:sldChg>
+    </pc:docChg>
+  </pc:docChgLst>
   <pc:docChgLst>
     <pc:chgData name="Matthieu De Mari" userId="dfb708c9-d8dc-439f-9a3b-c772bf4a311c" providerId="ADAL" clId="{8EE40018-26BD-4A7B-8D17-70AC8417C2D0}"/>
     <pc:docChg chg="undo custSel addSld delSld modSld addSection delSection modSection">
@@ -8452,7 +8493,7 @@
           <a:p>
             <a:fld id="{61478373-EB31-4867-8CF0-FA31364748A5}" type="datetimeFigureOut">
               <a:rPr lang="en-GB" smtClean="0"/>
-              <a:t>15/02/2023</a:t>
+              <a:t>06/07/2023</a:t>
             </a:fld>
             <a:endParaRPr lang="en-GB"/>
           </a:p>
@@ -8869,7 +8910,7 @@
           <a:p>
             <a:fld id="{E85DF616-B21E-4EF6-A6A5-95E2FB3EB1A1}" type="datetimeFigureOut">
               <a:rPr lang="en-GB" smtClean="0"/>
-              <a:t>15/02/2023</a:t>
+              <a:t>06/07/2023</a:t>
             </a:fld>
             <a:endParaRPr lang="en-GB"/>
           </a:p>
@@ -9069,7 +9110,7 @@
           <a:p>
             <a:fld id="{E85DF616-B21E-4EF6-A6A5-95E2FB3EB1A1}" type="datetimeFigureOut">
               <a:rPr lang="en-GB" smtClean="0"/>
-              <a:t>15/02/2023</a:t>
+              <a:t>06/07/2023</a:t>
             </a:fld>
             <a:endParaRPr lang="en-GB"/>
           </a:p>
@@ -9279,7 +9320,7 @@
           <a:p>
             <a:fld id="{E85DF616-B21E-4EF6-A6A5-95E2FB3EB1A1}" type="datetimeFigureOut">
               <a:rPr lang="en-GB" smtClean="0"/>
-              <a:t>15/02/2023</a:t>
+              <a:t>06/07/2023</a:t>
             </a:fld>
             <a:endParaRPr lang="en-GB"/>
           </a:p>
@@ -9479,7 +9520,7 @@
           <a:p>
             <a:fld id="{E85DF616-B21E-4EF6-A6A5-95E2FB3EB1A1}" type="datetimeFigureOut">
               <a:rPr lang="en-GB" smtClean="0"/>
-              <a:t>15/02/2023</a:t>
+              <a:t>06/07/2023</a:t>
             </a:fld>
             <a:endParaRPr lang="en-GB"/>
           </a:p>
@@ -9755,7 +9796,7 @@
           <a:p>
             <a:fld id="{E85DF616-B21E-4EF6-A6A5-95E2FB3EB1A1}" type="datetimeFigureOut">
               <a:rPr lang="en-GB" smtClean="0"/>
-              <a:t>15/02/2023</a:t>
+              <a:t>06/07/2023</a:t>
             </a:fld>
             <a:endParaRPr lang="en-GB"/>
           </a:p>
@@ -10023,7 +10064,7 @@
           <a:p>
             <a:fld id="{E85DF616-B21E-4EF6-A6A5-95E2FB3EB1A1}" type="datetimeFigureOut">
               <a:rPr lang="en-GB" smtClean="0"/>
-              <a:t>15/02/2023</a:t>
+              <a:t>06/07/2023</a:t>
             </a:fld>
             <a:endParaRPr lang="en-GB"/>
           </a:p>
@@ -10438,7 +10479,7 @@
           <a:p>
             <a:fld id="{E85DF616-B21E-4EF6-A6A5-95E2FB3EB1A1}" type="datetimeFigureOut">
               <a:rPr lang="en-GB" smtClean="0"/>
-              <a:t>15/02/2023</a:t>
+              <a:t>06/07/2023</a:t>
             </a:fld>
             <a:endParaRPr lang="en-GB"/>
           </a:p>
@@ -10580,7 +10621,7 @@
           <a:p>
             <a:fld id="{E85DF616-B21E-4EF6-A6A5-95E2FB3EB1A1}" type="datetimeFigureOut">
               <a:rPr lang="en-GB" smtClean="0"/>
-              <a:t>15/02/2023</a:t>
+              <a:t>06/07/2023</a:t>
             </a:fld>
             <a:endParaRPr lang="en-GB"/>
           </a:p>
@@ -10693,7 +10734,7 @@
           <a:p>
             <a:fld id="{E85DF616-B21E-4EF6-A6A5-95E2FB3EB1A1}" type="datetimeFigureOut">
               <a:rPr lang="en-GB" smtClean="0"/>
-              <a:t>15/02/2023</a:t>
+              <a:t>06/07/2023</a:t>
             </a:fld>
             <a:endParaRPr lang="en-GB"/>
           </a:p>
@@ -11006,7 +11047,7 @@
           <a:p>
             <a:fld id="{E85DF616-B21E-4EF6-A6A5-95E2FB3EB1A1}" type="datetimeFigureOut">
               <a:rPr lang="en-GB" smtClean="0"/>
-              <a:t>15/02/2023</a:t>
+              <a:t>06/07/2023</a:t>
             </a:fld>
             <a:endParaRPr lang="en-GB"/>
           </a:p>
@@ -11295,7 +11336,7 @@
           <a:p>
             <a:fld id="{E85DF616-B21E-4EF6-A6A5-95E2FB3EB1A1}" type="datetimeFigureOut">
               <a:rPr lang="en-GB" smtClean="0"/>
-              <a:t>15/02/2023</a:t>
+              <a:t>06/07/2023</a:t>
             </a:fld>
             <a:endParaRPr lang="en-GB"/>
           </a:p>
@@ -11538,7 +11579,7 @@
           <a:p>
             <a:fld id="{E85DF616-B21E-4EF6-A6A5-95E2FB3EB1A1}" type="datetimeFigureOut">
               <a:rPr lang="en-GB" smtClean="0"/>
-              <a:t>15/02/2023</a:t>
+              <a:t>06/07/2023</a:t>
             </a:fld>
             <a:endParaRPr lang="en-GB"/>
           </a:p>
@@ -19929,13 +19970,16 @@
           </a:bodyPr>
           <a:lstStyle/>
           <a:p>
+            <a:pPr marL="0" indent="0">
+              <a:buNone/>
+            </a:pPr>
             <a:r>
               <a:rPr lang="en-GB" dirty="0"/>
               <a:t>The previous milestone models have a very large number of layers and parameters: </a:t>
             </a:r>
             <a:r>
               <a:rPr lang="en-GB" b="1" dirty="0"/>
-              <a:t>training them on a laptop is out of the question</a:t>
+              <a:t>training them from scratch on a laptop is a bad idea</a:t>
             </a:r>
             <a:r>
               <a:rPr lang="en-GB" dirty="0"/>
@@ -19953,7 +19997,7 @@
             </a:r>
             <a:r>
               <a:rPr lang="en-GB" dirty="0"/>
-              <a:t>of these models that have been released on GitHub, and sometimes added to </a:t>
+              <a:t>of these models that have been released by their creators, on GitHub repositories, and sometimes added to </a:t>
             </a:r>
             <a:r>
               <a:rPr lang="en-GB" dirty="0" err="1"/>
@@ -19967,7 +20011,13 @@
           <a:p>
             <a:r>
               <a:rPr lang="en-GB" dirty="0"/>
-              <a:t>In fact, there are many more models that have marked the history of computer vision, but we have only covered the most famous ones. These days, however, these models are no longer considered best performance state-of-the-art. Some of these models, e.g. Inception, have even gone through many variations (Inception v1 was released in 2014, Inception v4 in 2016).</a:t>
+              <a:t>In fact, there are many more models that have marked the history of computer vision, but we have only covered the most famous ones.</a:t>
+            </a:r>
+          </a:p>
+          <a:p>
+            <a:r>
+              <a:rPr lang="en-GB" dirty="0"/>
+              <a:t>These days, however, these models are no longer considered best performance state-of-the-art. Some of these models, e.g. Inception, have even gone through many variations (Inception v1 was released in 2014, Inception v4 in 2016).</a:t>
             </a:r>
           </a:p>
           <a:p>
@@ -20154,6 +20204,247 @@
           <p:cNvPr id="2" name="Title 1">
             <a:extLst>
               <a:ext uri="{FF2B5EF4-FFF2-40B4-BE49-F238E27FC236}">
+                <a16:creationId xmlns:a16="http://schemas.microsoft.com/office/drawing/2014/main" id="{68407773-1C8C-985B-957C-EE20089179CB}"/>
+              </a:ext>
+            </a:extLst>
+          </p:cNvPr>
+          <p:cNvSpPr>
+            <a:spLocks noGrp="1"/>
+          </p:cNvSpPr>
+          <p:nvPr>
+            <p:ph type="title"/>
+          </p:nvPr>
+        </p:nvSpPr>
+        <p:spPr/>
+        <p:txBody>
+          <a:bodyPr/>
+          <a:lstStyle/>
+          <a:p>
+            <a:r>
+              <a:rPr lang="en-GB" dirty="0"/>
+              <a:t>More on Computer Vision</a:t>
+            </a:r>
+            <a:endParaRPr lang="en-SG" dirty="0"/>
+          </a:p>
+        </p:txBody>
+      </p:sp>
+      <p:sp>
+        <p:nvSpPr>
+          <p:cNvPr id="3" name="Content Placeholder 2">
+            <a:extLst>
+              <a:ext uri="{FF2B5EF4-FFF2-40B4-BE49-F238E27FC236}">
+                <a16:creationId xmlns:a16="http://schemas.microsoft.com/office/drawing/2014/main" id="{CC15B02E-4FC8-0A0E-E6EB-850476F34791}"/>
+              </a:ext>
+            </a:extLst>
+          </p:cNvPr>
+          <p:cNvSpPr>
+            <a:spLocks noGrp="1"/>
+          </p:cNvSpPr>
+          <p:nvPr>
+            <p:ph idx="1"/>
+          </p:nvPr>
+        </p:nvSpPr>
+        <p:spPr>
+          <a:xfrm>
+            <a:off x="838200" y="1825624"/>
+            <a:ext cx="10947400" cy="5032375"/>
+          </a:xfrm>
+        </p:spPr>
+        <p:txBody>
+          <a:bodyPr>
+            <a:normAutofit/>
+          </a:bodyPr>
+          <a:lstStyle/>
+          <a:p>
+            <a:r>
+              <a:rPr lang="en-GB" dirty="0">
+                <a:solidFill>
+                  <a:schemeClr val="bg1">
+                    <a:lumMod val="50000"/>
+                  </a:schemeClr>
+                </a:solidFill>
+              </a:rPr>
+              <a:t>If you are curious about the different versions of these milestone models and their more recent implementations, we invite the reader to have a look at the following list/</a:t>
+            </a:r>
+            <a:r>
+              <a:rPr lang="en-GB" dirty="0" err="1">
+                <a:solidFill>
+                  <a:schemeClr val="bg1">
+                    <a:lumMod val="50000"/>
+                  </a:schemeClr>
+                </a:solidFill>
+              </a:rPr>
+              <a:t>github</a:t>
+            </a:r>
+            <a:r>
+              <a:rPr lang="en-GB" dirty="0">
+                <a:solidFill>
+                  <a:schemeClr val="bg1">
+                    <a:lumMod val="50000"/>
+                  </a:schemeClr>
+                </a:solidFill>
+              </a:rPr>
+              <a:t> repo.</a:t>
+            </a:r>
+          </a:p>
+          <a:p>
+            <a:pPr marL="0" indent="0">
+              <a:buNone/>
+            </a:pPr>
+            <a:r>
+              <a:rPr lang="en-GB" dirty="0">
+                <a:solidFill>
+                  <a:schemeClr val="bg1">
+                    <a:lumMod val="50000"/>
+                  </a:schemeClr>
+                </a:solidFill>
+                <a:hlinkClick r:id="rId2">
+                  <a:extLst>
+                    <a:ext uri="{A12FA001-AC4F-418D-AE19-62706E023703}">
+                      <ahyp:hlinkClr xmlns:ahyp="http://schemas.microsoft.com/office/drawing/2018/hyperlinkcolor" val="tx"/>
+                    </a:ext>
+                  </a:extLst>
+                </a:hlinkClick>
+              </a:rPr>
+              <a:t>https://github.com/gmalivenko/awesome-computer-vision-models</a:t>
+            </a:r>
+            <a:endParaRPr lang="en-GB" dirty="0">
+              <a:solidFill>
+                <a:schemeClr val="bg1">
+                  <a:lumMod val="50000"/>
+                </a:schemeClr>
+              </a:solidFill>
+            </a:endParaRPr>
+          </a:p>
+          <a:p>
+            <a:endParaRPr lang="en-GB" dirty="0">
+              <a:solidFill>
+                <a:schemeClr val="bg1">
+                  <a:lumMod val="50000"/>
+                </a:schemeClr>
+              </a:solidFill>
+            </a:endParaRPr>
+          </a:p>
+          <a:p>
+            <a:r>
+              <a:rPr lang="en-GB" dirty="0">
+                <a:solidFill>
+                  <a:schemeClr val="bg1">
+                    <a:lumMod val="50000"/>
+                  </a:schemeClr>
+                </a:solidFill>
+              </a:rPr>
+              <a:t>We will NOT discuss the practical implementation of previous models, and gladly leave it to the Term 7 Computer Vision course at SUTD!</a:t>
+            </a:r>
+          </a:p>
+          <a:p>
+            <a:r>
+              <a:rPr lang="en-GB" dirty="0">
+                <a:solidFill>
+                  <a:schemeClr val="bg1">
+                    <a:lumMod val="50000"/>
+                  </a:schemeClr>
+                </a:solidFill>
+              </a:rPr>
+              <a:t>Strongly advise you to continue your training on Term 7!</a:t>
+            </a:r>
+          </a:p>
+          <a:p>
+            <a:pPr marL="0" indent="0">
+              <a:buNone/>
+            </a:pPr>
+            <a:r>
+              <a:rPr lang="en-GB" dirty="0">
+                <a:solidFill>
+                  <a:schemeClr val="bg1">
+                    <a:lumMod val="50000"/>
+                  </a:schemeClr>
+                </a:solidFill>
+                <a:hlinkClick r:id="rId3">
+                  <a:extLst>
+                    <a:ext uri="{A12FA001-AC4F-418D-AE19-62706E023703}">
+                      <ahyp:hlinkClr xmlns:ahyp="http://schemas.microsoft.com/office/drawing/2018/hyperlinkcolor" val="tx"/>
+                    </a:ext>
+                  </a:extLst>
+                </a:hlinkClick>
+              </a:rPr>
+              <a:t>https://istd.sutd.edu.sg/undergraduate/courses/50035-computer-vision</a:t>
+            </a:r>
+            <a:endParaRPr lang="en-GB" dirty="0">
+              <a:solidFill>
+                <a:schemeClr val="bg1">
+                  <a:lumMod val="50000"/>
+                </a:schemeClr>
+              </a:solidFill>
+            </a:endParaRPr>
+          </a:p>
+        </p:txBody>
+      </p:sp>
+      <p:pic>
+        <p:nvPicPr>
+          <p:cNvPr id="5" name="Picture 4">
+            <a:extLst>
+              <a:ext uri="{FF2B5EF4-FFF2-40B4-BE49-F238E27FC236}">
+                <a16:creationId xmlns:a16="http://schemas.microsoft.com/office/drawing/2014/main" id="{B7A6F6A9-98E7-D934-9F36-C456C5ABDBA8}"/>
+              </a:ext>
+            </a:extLst>
+          </p:cNvPr>
+          <p:cNvPicPr>
+            <a:picLocks noChangeAspect="1"/>
+          </p:cNvPicPr>
+          <p:nvPr/>
+        </p:nvPicPr>
+        <p:blipFill>
+          <a:blip r:embed="rId4"/>
+          <a:stretch>
+            <a:fillRect/>
+          </a:stretch>
+        </p:blipFill>
+        <p:spPr>
+          <a:xfrm>
+            <a:off x="1523149" y="365125"/>
+            <a:ext cx="9145702" cy="6258038"/>
+          </a:xfrm>
+          <a:prstGeom prst="rect">
+            <a:avLst/>
+          </a:prstGeom>
+        </p:spPr>
+      </p:pic>
+    </p:spTree>
+    <p:extLst>
+      <p:ext uri="{BB962C8B-B14F-4D97-AF65-F5344CB8AC3E}">
+        <p14:creationId xmlns:p14="http://schemas.microsoft.com/office/powerpoint/2010/main" val="3312885661"/>
+      </p:ext>
+    </p:extLst>
+  </p:cSld>
+  <p:clrMapOvr>
+    <a:masterClrMapping/>
+  </p:clrMapOvr>
+</p:sld>
+</file>
+
+<file path=ppt/slides/slide47.xml><?xml version="1.0" encoding="utf-8"?>
+<p:sld xmlns:a="http://schemas.openxmlformats.org/drawingml/2006/main" xmlns:r="http://schemas.openxmlformats.org/officeDocument/2006/relationships" xmlns:p="http://schemas.openxmlformats.org/presentationml/2006/main">
+  <p:cSld>
+    <p:spTree>
+      <p:nvGrpSpPr>
+        <p:cNvPr id="1" name=""/>
+        <p:cNvGrpSpPr/>
+        <p:nvPr/>
+      </p:nvGrpSpPr>
+      <p:grpSpPr>
+        <a:xfrm>
+          <a:off x="0" y="0"/>
+          <a:ext cx="0" cy="0"/>
+          <a:chOff x="0" y="0"/>
+          <a:chExt cx="0" cy="0"/>
+        </a:xfrm>
+      </p:grpSpPr>
+      <p:sp>
+        <p:nvSpPr>
+          <p:cNvPr id="2" name="Title 1">
+            <a:extLst>
+              <a:ext uri="{FF2B5EF4-FFF2-40B4-BE49-F238E27FC236}">
                 <a16:creationId xmlns:a16="http://schemas.microsoft.com/office/drawing/2014/main" id="{28A66009-3674-2F33-40E3-5F7C88BA63AF}"/>
               </a:ext>
             </a:extLst>
@@ -20315,7 +20606,7 @@
 </p:sld>
 </file>
 
-<file path=ppt/slides/slide47.xml><?xml version="1.0" encoding="utf-8"?>
+<file path=ppt/slides/slide48.xml><?xml version="1.0" encoding="utf-8"?>
 <p:sld xmlns:a="http://schemas.openxmlformats.org/drawingml/2006/main" xmlns:r="http://schemas.openxmlformats.org/officeDocument/2006/relationships" xmlns:p="http://schemas.openxmlformats.org/presentationml/2006/main">
   <p:cSld>
     <p:spTree>
@@ -20454,7 +20745,7 @@
 </p:sld>
 </file>
 
-<file path=ppt/slides/slide48.xml><?xml version="1.0" encoding="utf-8"?>
+<file path=ppt/slides/slide49.xml><?xml version="1.0" encoding="utf-8"?>
 <p:sld xmlns:a="http://schemas.openxmlformats.org/drawingml/2006/main" xmlns:r="http://schemas.openxmlformats.org/officeDocument/2006/relationships" xmlns:p="http://schemas.openxmlformats.org/presentationml/2006/main">
   <p:cSld>
     <p:spTree>
@@ -20639,214 +20930,6 @@
 </p:sld>
 </file>
 
-<file path=ppt/slides/slide49.xml><?xml version="1.0" encoding="utf-8"?>
-<p:sld xmlns:a="http://schemas.openxmlformats.org/drawingml/2006/main" xmlns:r="http://schemas.openxmlformats.org/officeDocument/2006/relationships" xmlns:p="http://schemas.openxmlformats.org/presentationml/2006/main">
-  <p:cSld>
-    <p:spTree>
-      <p:nvGrpSpPr>
-        <p:cNvPr id="1" name=""/>
-        <p:cNvGrpSpPr/>
-        <p:nvPr/>
-      </p:nvGrpSpPr>
-      <p:grpSpPr>
-        <a:xfrm>
-          <a:off x="0" y="0"/>
-          <a:ext cx="0" cy="0"/>
-          <a:chOff x="0" y="0"/>
-          <a:chExt cx="0" cy="0"/>
-        </a:xfrm>
-      </p:grpSpPr>
-      <p:sp>
-        <p:nvSpPr>
-          <p:cNvPr id="2" name="Title 1">
-            <a:extLst>
-              <a:ext uri="{FF2B5EF4-FFF2-40B4-BE49-F238E27FC236}">
-                <a16:creationId xmlns:a16="http://schemas.microsoft.com/office/drawing/2014/main" id="{8403C2D5-263C-6431-9E3B-012C163E3451}"/>
-              </a:ext>
-            </a:extLst>
-          </p:cNvPr>
-          <p:cNvSpPr>
-            <a:spLocks noGrp="1"/>
-          </p:cNvSpPr>
-          <p:nvPr>
-            <p:ph type="title"/>
-          </p:nvPr>
-        </p:nvSpPr>
-        <p:spPr/>
-        <p:txBody>
-          <a:bodyPr/>
-          <a:lstStyle/>
-          <a:p>
-            <a:r>
-              <a:rPr lang="en-GB" dirty="0"/>
-              <a:t>Transfer Learning of </a:t>
-            </a:r>
-            <a:r>
-              <a:rPr lang="en-GB" dirty="0" err="1"/>
-              <a:t>ResNet</a:t>
-            </a:r>
-            <a:r>
-              <a:rPr lang="en-GB" dirty="0"/>
-              <a:t> to MNIST</a:t>
-            </a:r>
-            <a:endParaRPr lang="en-SG" dirty="0"/>
-          </a:p>
-        </p:txBody>
-      </p:sp>
-      <p:sp>
-        <p:nvSpPr>
-          <p:cNvPr id="4" name="Content Placeholder 3">
-            <a:extLst>
-              <a:ext uri="{FF2B5EF4-FFF2-40B4-BE49-F238E27FC236}">
-                <a16:creationId xmlns:a16="http://schemas.microsoft.com/office/drawing/2014/main" id="{7D3C4361-39ED-8455-F41E-48593F709DE8}"/>
-              </a:ext>
-            </a:extLst>
-          </p:cNvPr>
-          <p:cNvSpPr>
-            <a:spLocks noGrp="1"/>
-          </p:cNvSpPr>
-          <p:nvPr>
-            <p:ph sz="half" idx="1"/>
-          </p:nvPr>
-        </p:nvSpPr>
-        <p:spPr/>
-        <p:txBody>
-          <a:bodyPr/>
-          <a:lstStyle/>
-          <a:p>
-            <a:pPr marL="0" indent="0">
-              <a:buNone/>
-            </a:pPr>
-            <a:r>
-              <a:rPr lang="en-GB" dirty="0"/>
-              <a:t>Let us</a:t>
-            </a:r>
-          </a:p>
-          <a:p>
-            <a:pPr marL="514350" indent="-514350">
-              <a:buFont typeface="+mj-lt"/>
-              <a:buAutoNum type="arabicPeriod"/>
-            </a:pPr>
-            <a:r>
-              <a:rPr lang="en-GB" dirty="0"/>
-              <a:t>Prepare the MNIST dataset,</a:t>
-            </a:r>
-          </a:p>
-          <a:p>
-            <a:pPr marL="514350" indent="-514350">
-              <a:buFont typeface="+mj-lt"/>
-              <a:buAutoNum type="arabicPeriod"/>
-            </a:pPr>
-            <a:r>
-              <a:rPr lang="en-GB" dirty="0"/>
-              <a:t>Download the pre-trained version of a </a:t>
-            </a:r>
-            <a:r>
-              <a:rPr lang="en-GB" dirty="0" err="1"/>
-              <a:t>ResNet</a:t>
-            </a:r>
-            <a:r>
-              <a:rPr lang="en-GB" dirty="0"/>
-              <a:t>,</a:t>
-            </a:r>
-          </a:p>
-          <a:p>
-            <a:pPr marL="514350" indent="-514350">
-              <a:buFont typeface="+mj-lt"/>
-              <a:buAutoNum type="arabicPeriod"/>
-            </a:pPr>
-            <a:r>
-              <a:rPr lang="en-GB" dirty="0"/>
-              <a:t>Replace the initial layer so network uses MNIST images,</a:t>
-            </a:r>
-            <a:endParaRPr lang="en-SG" dirty="0"/>
-          </a:p>
-        </p:txBody>
-      </p:sp>
-      <p:sp>
-        <p:nvSpPr>
-          <p:cNvPr id="3" name="Content Placeholder 2">
-            <a:extLst>
-              <a:ext uri="{FF2B5EF4-FFF2-40B4-BE49-F238E27FC236}">
-                <a16:creationId xmlns:a16="http://schemas.microsoft.com/office/drawing/2014/main" id="{E80DD1FC-892D-6828-628A-D424AA621005}"/>
-              </a:ext>
-            </a:extLst>
-          </p:cNvPr>
-          <p:cNvSpPr>
-            <a:spLocks noGrp="1"/>
-          </p:cNvSpPr>
-          <p:nvPr>
-            <p:ph sz="half" idx="2"/>
-          </p:nvPr>
-        </p:nvSpPr>
-        <p:spPr/>
-        <p:txBody>
-          <a:bodyPr/>
-          <a:lstStyle/>
-          <a:p>
-            <a:pPr marL="0" indent="0">
-              <a:buNone/>
-            </a:pPr>
-            <a:r>
-              <a:rPr lang="en-GB" dirty="0"/>
-              <a:t>ImageNet is a RGB dataset, but MNIST is a greyscale one.</a:t>
-            </a:r>
-          </a:p>
-          <a:p>
-            <a:pPr marL="0" indent="0">
-              <a:buNone/>
-            </a:pPr>
-            <a:r>
-              <a:rPr lang="en-GB" dirty="0"/>
-              <a:t>We simply remove the initial layer and replace it with an untrained layer that takes images with 1 channel instead of 3.</a:t>
-            </a:r>
-            <a:endParaRPr lang="en-SG" dirty="0"/>
-          </a:p>
-        </p:txBody>
-      </p:sp>
-      <p:pic>
-        <p:nvPicPr>
-          <p:cNvPr id="10" name="Picture 9">
-            <a:extLst>
-              <a:ext uri="{FF2B5EF4-FFF2-40B4-BE49-F238E27FC236}">
-                <a16:creationId xmlns:a16="http://schemas.microsoft.com/office/drawing/2014/main" id="{3EA27EAD-0666-D7DD-369D-20192E2712D4}"/>
-              </a:ext>
-            </a:extLst>
-          </p:cNvPr>
-          <p:cNvPicPr>
-            <a:picLocks noChangeAspect="1"/>
-          </p:cNvPicPr>
-          <p:nvPr/>
-        </p:nvPicPr>
-        <p:blipFill>
-          <a:blip r:embed="rId2"/>
-          <a:stretch>
-            <a:fillRect/>
-          </a:stretch>
-        </p:blipFill>
-        <p:spPr>
-          <a:xfrm>
-            <a:off x="248387" y="5420033"/>
-            <a:ext cx="11234007" cy="1072842"/>
-          </a:xfrm>
-          <a:prstGeom prst="rect">
-            <a:avLst/>
-          </a:prstGeom>
-        </p:spPr>
-      </p:pic>
-    </p:spTree>
-    <p:extLst>
-      <p:ext uri="{BB962C8B-B14F-4D97-AF65-F5344CB8AC3E}">
-        <p14:creationId xmlns:p14="http://schemas.microsoft.com/office/powerpoint/2010/main" val="1860638052"/>
-      </p:ext>
-    </p:extLst>
-  </p:cSld>
-  <p:clrMapOvr>
-    <a:masterClrMapping/>
-  </p:clrMapOvr>
-</p:sld>
-</file>
-
 <file path=ppt/slides/slide5.xml><?xml version="1.0" encoding="utf-8"?>
 <p:sld xmlns:a="http://schemas.openxmlformats.org/drawingml/2006/main" xmlns:r="http://schemas.openxmlformats.org/officeDocument/2006/relationships" xmlns:p="http://schemas.openxmlformats.org/presentationml/2006/main">
   <p:cSld>
@@ -21222,6 +21305,214 @@
         </p:nvSpPr>
         <p:spPr/>
         <p:txBody>
+          <a:bodyPr/>
+          <a:lstStyle/>
+          <a:p>
+            <a:pPr marL="0" indent="0">
+              <a:buNone/>
+            </a:pPr>
+            <a:r>
+              <a:rPr lang="en-GB" dirty="0"/>
+              <a:t>Let us</a:t>
+            </a:r>
+          </a:p>
+          <a:p>
+            <a:pPr marL="514350" indent="-514350">
+              <a:buFont typeface="+mj-lt"/>
+              <a:buAutoNum type="arabicPeriod"/>
+            </a:pPr>
+            <a:r>
+              <a:rPr lang="en-GB" dirty="0"/>
+              <a:t>Prepare the MNIST dataset,</a:t>
+            </a:r>
+          </a:p>
+          <a:p>
+            <a:pPr marL="514350" indent="-514350">
+              <a:buFont typeface="+mj-lt"/>
+              <a:buAutoNum type="arabicPeriod"/>
+            </a:pPr>
+            <a:r>
+              <a:rPr lang="en-GB" dirty="0"/>
+              <a:t>Download the pre-trained version of a </a:t>
+            </a:r>
+            <a:r>
+              <a:rPr lang="en-GB" dirty="0" err="1"/>
+              <a:t>ResNet</a:t>
+            </a:r>
+            <a:r>
+              <a:rPr lang="en-GB" dirty="0"/>
+              <a:t>,</a:t>
+            </a:r>
+          </a:p>
+          <a:p>
+            <a:pPr marL="514350" indent="-514350">
+              <a:buFont typeface="+mj-lt"/>
+              <a:buAutoNum type="arabicPeriod"/>
+            </a:pPr>
+            <a:r>
+              <a:rPr lang="en-GB" dirty="0"/>
+              <a:t>Replace the initial layer so network uses MNIST images,</a:t>
+            </a:r>
+            <a:endParaRPr lang="en-SG" dirty="0"/>
+          </a:p>
+        </p:txBody>
+      </p:sp>
+      <p:sp>
+        <p:nvSpPr>
+          <p:cNvPr id="3" name="Content Placeholder 2">
+            <a:extLst>
+              <a:ext uri="{FF2B5EF4-FFF2-40B4-BE49-F238E27FC236}">
+                <a16:creationId xmlns:a16="http://schemas.microsoft.com/office/drawing/2014/main" id="{E80DD1FC-892D-6828-628A-D424AA621005}"/>
+              </a:ext>
+            </a:extLst>
+          </p:cNvPr>
+          <p:cNvSpPr>
+            <a:spLocks noGrp="1"/>
+          </p:cNvSpPr>
+          <p:nvPr>
+            <p:ph sz="half" idx="2"/>
+          </p:nvPr>
+        </p:nvSpPr>
+        <p:spPr/>
+        <p:txBody>
+          <a:bodyPr/>
+          <a:lstStyle/>
+          <a:p>
+            <a:pPr marL="0" indent="0">
+              <a:buNone/>
+            </a:pPr>
+            <a:r>
+              <a:rPr lang="en-GB" dirty="0"/>
+              <a:t>ImageNet is a RGB dataset, but MNIST is a greyscale one.</a:t>
+            </a:r>
+          </a:p>
+          <a:p>
+            <a:pPr marL="0" indent="0">
+              <a:buNone/>
+            </a:pPr>
+            <a:r>
+              <a:rPr lang="en-GB" dirty="0"/>
+              <a:t>We simply remove the initial layer and replace it with an untrained layer that takes images with 1 channel instead of 3.</a:t>
+            </a:r>
+            <a:endParaRPr lang="en-SG" dirty="0"/>
+          </a:p>
+        </p:txBody>
+      </p:sp>
+      <p:pic>
+        <p:nvPicPr>
+          <p:cNvPr id="10" name="Picture 9">
+            <a:extLst>
+              <a:ext uri="{FF2B5EF4-FFF2-40B4-BE49-F238E27FC236}">
+                <a16:creationId xmlns:a16="http://schemas.microsoft.com/office/drawing/2014/main" id="{3EA27EAD-0666-D7DD-369D-20192E2712D4}"/>
+              </a:ext>
+            </a:extLst>
+          </p:cNvPr>
+          <p:cNvPicPr>
+            <a:picLocks noChangeAspect="1"/>
+          </p:cNvPicPr>
+          <p:nvPr/>
+        </p:nvPicPr>
+        <p:blipFill>
+          <a:blip r:embed="rId2"/>
+          <a:stretch>
+            <a:fillRect/>
+          </a:stretch>
+        </p:blipFill>
+        <p:spPr>
+          <a:xfrm>
+            <a:off x="248387" y="5420033"/>
+            <a:ext cx="11234007" cy="1072842"/>
+          </a:xfrm>
+          <a:prstGeom prst="rect">
+            <a:avLst/>
+          </a:prstGeom>
+        </p:spPr>
+      </p:pic>
+    </p:spTree>
+    <p:extLst>
+      <p:ext uri="{BB962C8B-B14F-4D97-AF65-F5344CB8AC3E}">
+        <p14:creationId xmlns:p14="http://schemas.microsoft.com/office/powerpoint/2010/main" val="1860638052"/>
+      </p:ext>
+    </p:extLst>
+  </p:cSld>
+  <p:clrMapOvr>
+    <a:masterClrMapping/>
+  </p:clrMapOvr>
+</p:sld>
+</file>
+
+<file path=ppt/slides/slide51.xml><?xml version="1.0" encoding="utf-8"?>
+<p:sld xmlns:a="http://schemas.openxmlformats.org/drawingml/2006/main" xmlns:r="http://schemas.openxmlformats.org/officeDocument/2006/relationships" xmlns:p="http://schemas.openxmlformats.org/presentationml/2006/main">
+  <p:cSld>
+    <p:spTree>
+      <p:nvGrpSpPr>
+        <p:cNvPr id="1" name=""/>
+        <p:cNvGrpSpPr/>
+        <p:nvPr/>
+      </p:nvGrpSpPr>
+      <p:grpSpPr>
+        <a:xfrm>
+          <a:off x="0" y="0"/>
+          <a:ext cx="0" cy="0"/>
+          <a:chOff x="0" y="0"/>
+          <a:chExt cx="0" cy="0"/>
+        </a:xfrm>
+      </p:grpSpPr>
+      <p:sp>
+        <p:nvSpPr>
+          <p:cNvPr id="2" name="Title 1">
+            <a:extLst>
+              <a:ext uri="{FF2B5EF4-FFF2-40B4-BE49-F238E27FC236}">
+                <a16:creationId xmlns:a16="http://schemas.microsoft.com/office/drawing/2014/main" id="{8403C2D5-263C-6431-9E3B-012C163E3451}"/>
+              </a:ext>
+            </a:extLst>
+          </p:cNvPr>
+          <p:cNvSpPr>
+            <a:spLocks noGrp="1"/>
+          </p:cNvSpPr>
+          <p:nvPr>
+            <p:ph type="title"/>
+          </p:nvPr>
+        </p:nvSpPr>
+        <p:spPr/>
+        <p:txBody>
+          <a:bodyPr/>
+          <a:lstStyle/>
+          <a:p>
+            <a:r>
+              <a:rPr lang="en-GB" dirty="0"/>
+              <a:t>Transfer Learning of </a:t>
+            </a:r>
+            <a:r>
+              <a:rPr lang="en-GB" dirty="0" err="1"/>
+              <a:t>ResNet</a:t>
+            </a:r>
+            <a:r>
+              <a:rPr lang="en-GB" dirty="0"/>
+              <a:t> to MNIST</a:t>
+            </a:r>
+            <a:endParaRPr lang="en-SG" dirty="0"/>
+          </a:p>
+        </p:txBody>
+      </p:sp>
+      <p:sp>
+        <p:nvSpPr>
+          <p:cNvPr id="4" name="Content Placeholder 3">
+            <a:extLst>
+              <a:ext uri="{FF2B5EF4-FFF2-40B4-BE49-F238E27FC236}">
+                <a16:creationId xmlns:a16="http://schemas.microsoft.com/office/drawing/2014/main" id="{7D3C4361-39ED-8455-F41E-48593F709DE8}"/>
+              </a:ext>
+            </a:extLst>
+          </p:cNvPr>
+          <p:cNvSpPr>
+            <a:spLocks noGrp="1"/>
+          </p:cNvSpPr>
+          <p:nvPr>
+            <p:ph sz="half" idx="1"/>
+          </p:nvPr>
+        </p:nvSpPr>
+        <p:spPr/>
+        <p:txBody>
           <a:bodyPr>
             <a:normAutofit/>
           </a:bodyPr>
@@ -21371,7 +21662,7 @@
 </p:sld>
 </file>
 
-<file path=ppt/slides/slide51.xml><?xml version="1.0" encoding="utf-8"?>
+<file path=ppt/slides/slide52.xml><?xml version="1.0" encoding="utf-8"?>
 <p:sld xmlns:a="http://schemas.openxmlformats.org/drawingml/2006/main" xmlns:r="http://schemas.openxmlformats.org/officeDocument/2006/relationships" xmlns:p="http://schemas.openxmlformats.org/presentationml/2006/main">
   <p:cSld>
     <p:spTree>
@@ -21599,7 +21890,7 @@
 </p:sld>
 </file>
 
-<file path=ppt/slides/slide52.xml><?xml version="1.0" encoding="utf-8"?>
+<file path=ppt/slides/slide53.xml><?xml version="1.0" encoding="utf-8"?>
 <p:sld xmlns:a="http://schemas.openxmlformats.org/drawingml/2006/main" xmlns:r="http://schemas.openxmlformats.org/officeDocument/2006/relationships" xmlns:p="http://schemas.openxmlformats.org/presentationml/2006/main">
   <p:cSld>
     <p:spTree>
@@ -21835,7 +22126,7 @@
 </p:sld>
 </file>
 
-<file path=ppt/slides/slide53.xml><?xml version="1.0" encoding="utf-8"?>
+<file path=ppt/slides/slide54.xml><?xml version="1.0" encoding="utf-8"?>
 <p:sld xmlns:a="http://schemas.openxmlformats.org/drawingml/2006/main" xmlns:r="http://schemas.openxmlformats.org/officeDocument/2006/relationships" xmlns:p="http://schemas.openxmlformats.org/presentationml/2006/main">
   <p:cSld>
     <p:spTree>
@@ -22048,7 +22339,7 @@
 </p:sld>
 </file>
 
-<file path=ppt/slides/slide54.xml><?xml version="1.0" encoding="utf-8"?>
+<file path=ppt/slides/slide55.xml><?xml version="1.0" encoding="utf-8"?>
 <p:sld xmlns:a="http://schemas.openxmlformats.org/drawingml/2006/main" xmlns:r="http://schemas.openxmlformats.org/officeDocument/2006/relationships" xmlns:p="http://schemas.openxmlformats.org/presentationml/2006/main">
   <p:cSld>
     <p:spTree>
@@ -22194,7 +22485,7 @@
 </p:sld>
 </file>
 
-<file path=ppt/slides/slide55.xml><?xml version="1.0" encoding="utf-8"?>
+<file path=ppt/slides/slide56.xml><?xml version="1.0" encoding="utf-8"?>
 <p:sld xmlns:a="http://schemas.openxmlformats.org/drawingml/2006/main" xmlns:r="http://schemas.openxmlformats.org/officeDocument/2006/relationships" xmlns:p="http://schemas.openxmlformats.org/presentationml/2006/main">
   <p:cSld>
     <p:spTree>
@@ -22413,7 +22704,7 @@
 </p:sld>
 </file>
 
-<file path=ppt/slides/slide56.xml><?xml version="1.0" encoding="utf-8"?>
+<file path=ppt/slides/slide57.xml><?xml version="1.0" encoding="utf-8"?>
 <p:sld xmlns:a="http://schemas.openxmlformats.org/drawingml/2006/main" xmlns:r="http://schemas.openxmlformats.org/officeDocument/2006/relationships" xmlns:p="http://schemas.openxmlformats.org/presentationml/2006/main">
   <p:cSld>
     <p:spTree>
@@ -22591,252 +22882,6 @@
     <p:extLst>
       <p:ext uri="{BB962C8B-B14F-4D97-AF65-F5344CB8AC3E}">
         <p14:creationId xmlns:p14="http://schemas.microsoft.com/office/powerpoint/2010/main" val="1036081419"/>
-      </p:ext>
-    </p:extLst>
-  </p:cSld>
-  <p:clrMapOvr>
-    <a:masterClrMapping/>
-  </p:clrMapOvr>
-</p:sld>
-</file>
-
-<file path=ppt/slides/slide57.xml><?xml version="1.0" encoding="utf-8"?>
-<p:sld xmlns:a="http://schemas.openxmlformats.org/drawingml/2006/main" xmlns:r="http://schemas.openxmlformats.org/officeDocument/2006/relationships" xmlns:p="http://schemas.openxmlformats.org/presentationml/2006/main">
-  <p:cSld>
-    <p:spTree>
-      <p:nvGrpSpPr>
-        <p:cNvPr id="1" name=""/>
-        <p:cNvGrpSpPr/>
-        <p:nvPr/>
-      </p:nvGrpSpPr>
-      <p:grpSpPr>
-        <a:xfrm>
-          <a:off x="0" y="0"/>
-          <a:ext cx="0" cy="0"/>
-          <a:chOff x="0" y="0"/>
-          <a:chExt cx="0" cy="0"/>
-        </a:xfrm>
-      </p:grpSpPr>
-      <p:sp>
-        <p:nvSpPr>
-          <p:cNvPr id="2" name="Title 1">
-            <a:extLst>
-              <a:ext uri="{FF2B5EF4-FFF2-40B4-BE49-F238E27FC236}">
-                <a16:creationId xmlns:a16="http://schemas.microsoft.com/office/drawing/2014/main" id="{F6E33F64-ACBF-414C-8E71-06E4F9517B15}"/>
-              </a:ext>
-            </a:extLst>
-          </p:cNvPr>
-          <p:cNvSpPr>
-            <a:spLocks noGrp="1"/>
-          </p:cNvSpPr>
-          <p:nvPr>
-            <p:ph type="title"/>
-          </p:nvPr>
-        </p:nvSpPr>
-        <p:spPr/>
-        <p:txBody>
-          <a:bodyPr/>
-          <a:lstStyle/>
-          <a:p>
-            <a:r>
-              <a:rPr lang="en-US" dirty="0"/>
-              <a:t>Learn more about these topics</a:t>
-            </a:r>
-            <a:endParaRPr lang="en-GB" dirty="0"/>
-          </a:p>
-        </p:txBody>
-      </p:sp>
-      <p:sp>
-        <p:nvSpPr>
-          <p:cNvPr id="3" name="Content Placeholder 2">
-            <a:extLst>
-              <a:ext uri="{FF2B5EF4-FFF2-40B4-BE49-F238E27FC236}">
-                <a16:creationId xmlns:a16="http://schemas.microsoft.com/office/drawing/2014/main" id="{C71C8DD6-14D1-44DF-9843-EFEDF44E39A2}"/>
-              </a:ext>
-            </a:extLst>
-          </p:cNvPr>
-          <p:cNvSpPr>
-            <a:spLocks noGrp="1"/>
-          </p:cNvSpPr>
-          <p:nvPr>
-            <p:ph idx="1"/>
-          </p:nvPr>
-        </p:nvSpPr>
-        <p:spPr>
-          <a:xfrm>
-            <a:off x="838200" y="1825624"/>
-            <a:ext cx="10916138" cy="5032375"/>
-          </a:xfrm>
-        </p:spPr>
-        <p:txBody>
-          <a:bodyPr>
-            <a:normAutofit/>
-          </a:bodyPr>
-          <a:lstStyle/>
-          <a:p>
-            <a:pPr marL="0" indent="0">
-              <a:buNone/>
-            </a:pPr>
-            <a:r>
-              <a:rPr lang="en-US" dirty="0"/>
-              <a:t>Out of class, supporting papers, for those of you who are curious.</a:t>
-            </a:r>
-          </a:p>
-          <a:p>
-            <a:r>
-              <a:rPr lang="en-GB" dirty="0"/>
-              <a:t>[Krizhevsky2012] A. </a:t>
-            </a:r>
-            <a:r>
-              <a:rPr lang="en-GB" b="1" dirty="0" err="1">
-                <a:solidFill>
-                  <a:schemeClr val="accent2">
-                    <a:lumMod val="50000"/>
-                  </a:schemeClr>
-                </a:solidFill>
-              </a:rPr>
-              <a:t>Krizhevsky</a:t>
-            </a:r>
-            <a:r>
-              <a:rPr lang="en-GB" dirty="0"/>
-              <a:t>, I. </a:t>
-            </a:r>
-            <a:r>
-              <a:rPr lang="en-GB" b="1" dirty="0" err="1">
-                <a:solidFill>
-                  <a:schemeClr val="accent2">
-                    <a:lumMod val="50000"/>
-                  </a:schemeClr>
-                </a:solidFill>
-              </a:rPr>
-              <a:t>Sutskever</a:t>
-            </a:r>
-            <a:r>
-              <a:rPr lang="en-GB" dirty="0"/>
-              <a:t>, and G. </a:t>
-            </a:r>
-            <a:r>
-              <a:rPr lang="en-GB" b="1" dirty="0">
-                <a:solidFill>
-                  <a:schemeClr val="accent2">
-                    <a:lumMod val="50000"/>
-                  </a:schemeClr>
-                </a:solidFill>
-              </a:rPr>
-              <a:t>Hinton</a:t>
-            </a:r>
-            <a:r>
-              <a:rPr lang="en-GB" dirty="0"/>
-              <a:t>, “ImageNet Classification with Deep Convolutional Neural Networks”, 2012.</a:t>
-            </a:r>
-            <a:endParaRPr lang="en-US" dirty="0"/>
-          </a:p>
-          <a:p>
-            <a:r>
-              <a:rPr lang="en-US" dirty="0"/>
-              <a:t>[</a:t>
-            </a:r>
-            <a:r>
-              <a:rPr lang="en-GB" dirty="0"/>
-              <a:t>Simonyan2014</a:t>
-            </a:r>
-            <a:r>
-              <a:rPr lang="en-US" dirty="0"/>
-              <a:t>] </a:t>
-            </a:r>
-            <a:r>
-              <a:rPr lang="en-GB" dirty="0"/>
-              <a:t>K. </a:t>
-            </a:r>
-            <a:r>
-              <a:rPr lang="en-GB" b="1" dirty="0" err="1">
-                <a:solidFill>
-                  <a:schemeClr val="accent2">
-                    <a:lumMod val="50000"/>
-                  </a:schemeClr>
-                </a:solidFill>
-              </a:rPr>
-              <a:t>Simonyan</a:t>
-            </a:r>
-            <a:r>
-              <a:rPr lang="en-GB" dirty="0"/>
-              <a:t> and A. </a:t>
-            </a:r>
-            <a:r>
-              <a:rPr lang="en-GB" b="1" dirty="0">
-                <a:solidFill>
-                  <a:schemeClr val="accent2">
-                    <a:lumMod val="50000"/>
-                  </a:schemeClr>
-                </a:solidFill>
-              </a:rPr>
-              <a:t>Zisserman</a:t>
-            </a:r>
-            <a:r>
-              <a:rPr lang="en-GB" dirty="0"/>
-              <a:t> “Very Deep Convolutional Networks for Large-Scale Image Recognition”, 2014.</a:t>
-            </a:r>
-          </a:p>
-          <a:p>
-            <a:r>
-              <a:rPr lang="en-GB" dirty="0"/>
-              <a:t>[He2015] K. </a:t>
-            </a:r>
-            <a:r>
-              <a:rPr lang="en-GB" b="1" dirty="0">
-                <a:solidFill>
-                  <a:schemeClr val="accent2">
-                    <a:lumMod val="50000"/>
-                  </a:schemeClr>
-                </a:solidFill>
-              </a:rPr>
-              <a:t>He</a:t>
-            </a:r>
-            <a:r>
-              <a:rPr lang="en-GB" dirty="0"/>
-              <a:t>, X. Zhang, S. </a:t>
-            </a:r>
-            <a:r>
-              <a:rPr lang="en-GB" b="1" dirty="0">
-                <a:solidFill>
-                  <a:schemeClr val="accent2">
-                    <a:lumMod val="50000"/>
-                  </a:schemeClr>
-                </a:solidFill>
-              </a:rPr>
-              <a:t>Ren</a:t>
-            </a:r>
-            <a:r>
-              <a:rPr lang="en-GB" dirty="0"/>
-              <a:t>, and J. </a:t>
-            </a:r>
-            <a:r>
-              <a:rPr lang="en-GB" b="1" dirty="0">
-                <a:solidFill>
-                  <a:schemeClr val="accent2">
-                    <a:lumMod val="50000"/>
-                  </a:schemeClr>
-                </a:solidFill>
-              </a:rPr>
-              <a:t>Sun</a:t>
-            </a:r>
-            <a:r>
-              <a:rPr lang="en-GB" dirty="0"/>
-              <a:t> “Deep Residual Learning for Image Recognition”, 2015.</a:t>
-            </a:r>
-          </a:p>
-          <a:p>
-            <a:endParaRPr lang="en-GB" dirty="0"/>
-          </a:p>
-          <a:p>
-            <a:endParaRPr lang="en-GB" dirty="0"/>
-          </a:p>
-        </p:txBody>
-      </p:sp>
-    </p:spTree>
-    <p:extLst>
-      <p:ext uri="{BB962C8B-B14F-4D97-AF65-F5344CB8AC3E}">
-        <p14:creationId xmlns:p14="http://schemas.microsoft.com/office/powerpoint/2010/main" val="1782110643"/>
       </p:ext>
     </p:extLst>
   </p:cSld>
@@ -22930,42 +22975,36 @@
           </a:p>
           <a:p>
             <a:r>
-              <a:rPr lang="en-SG" dirty="0"/>
-              <a:t>[Huang2016] G. Huang, Z. Liu, L. van der </a:t>
-            </a:r>
-            <a:r>
-              <a:rPr lang="en-SG" dirty="0" err="1"/>
-              <a:t>Maaten</a:t>
-            </a:r>
-            <a:r>
-              <a:rPr lang="en-SG" dirty="0"/>
-              <a:t>, K. Q. Weinberger, “Densely Connected Convolutional Networks”, 2016.</a:t>
-            </a:r>
-          </a:p>
-          <a:p>
-            <a:r>
-              <a:rPr lang="en-SG" dirty="0"/>
-              <a:t>[Szegedy2014] C. </a:t>
-            </a:r>
-            <a:r>
-              <a:rPr lang="en-SG" b="1" dirty="0" err="1">
+              <a:rPr lang="en-GB" dirty="0"/>
+              <a:t>[Krizhevsky2012] A. </a:t>
+            </a:r>
+            <a:r>
+              <a:rPr lang="en-GB" b="1" dirty="0" err="1">
                 <a:solidFill>
                   <a:schemeClr val="accent2">
                     <a:lumMod val="50000"/>
                   </a:schemeClr>
                 </a:solidFill>
               </a:rPr>
-              <a:t>Szegedy</a:t>
-            </a:r>
-            <a:r>
-              <a:rPr lang="en-SG" dirty="0"/>
-              <a:t> et al., “Going deeper with convolutions”, 2014.</a:t>
-            </a:r>
-          </a:p>
-          <a:p>
-            <a:r>
-              <a:rPr lang="en-GB" dirty="0"/>
-              <a:t>[Tan2019] M. Tan and Q. V. </a:t>
+              <a:t>Krizhevsky</a:t>
+            </a:r>
+            <a:r>
+              <a:rPr lang="en-GB" dirty="0"/>
+              <a:t>, I. </a:t>
+            </a:r>
+            <a:r>
+              <a:rPr lang="en-GB" b="1" dirty="0" err="1">
+                <a:solidFill>
+                  <a:schemeClr val="accent2">
+                    <a:lumMod val="50000"/>
+                  </a:schemeClr>
+                </a:solidFill>
+              </a:rPr>
+              <a:t>Sutskever</a:t>
+            </a:r>
+            <a:r>
+              <a:rPr lang="en-GB" dirty="0"/>
+              <a:t>, and G. </a:t>
             </a:r>
             <a:r>
               <a:rPr lang="en-GB" b="1" dirty="0">
@@ -22975,33 +23014,106 @@
                   </a:schemeClr>
                 </a:solidFill>
               </a:rPr>
-              <a:t>Le</a:t>
-            </a:r>
-            <a:r>
-              <a:rPr lang="en-GB" dirty="0"/>
-              <a:t>, “</a:t>
-            </a:r>
-            <a:r>
-              <a:rPr lang="en-GB" dirty="0" err="1"/>
-              <a:t>EfficientNet</a:t>
-            </a:r>
-            <a:r>
-              <a:rPr lang="en-GB" dirty="0"/>
-              <a:t>: Rethinking Model Scaling for Convolutional Neural Networks”, 2019.</a:t>
-            </a:r>
-          </a:p>
-          <a:p>
-            <a:r>
-              <a:rPr lang="en-GB" dirty="0"/>
-              <a:t>[Yosinski2014] J. </a:t>
-            </a:r>
-            <a:r>
-              <a:rPr lang="en-GB" dirty="0" err="1"/>
-              <a:t>Yosinski</a:t>
-            </a:r>
-            <a:r>
-              <a:rPr lang="en-GB" dirty="0"/>
-              <a:t> et al., “How transferable are features in deep neural networks?” 2014.</a:t>
+              <a:t>Hinton</a:t>
+            </a:r>
+            <a:r>
+              <a:rPr lang="en-GB" dirty="0"/>
+              <a:t>, “ImageNet Classification with Deep Convolutional Neural Networks”, 2012.</a:t>
+            </a:r>
+            <a:endParaRPr lang="en-US" dirty="0"/>
+          </a:p>
+          <a:p>
+            <a:r>
+              <a:rPr lang="en-US" dirty="0"/>
+              <a:t>[</a:t>
+            </a:r>
+            <a:r>
+              <a:rPr lang="en-GB" dirty="0"/>
+              <a:t>Simonyan2014</a:t>
+            </a:r>
+            <a:r>
+              <a:rPr lang="en-US" dirty="0"/>
+              <a:t>] </a:t>
+            </a:r>
+            <a:r>
+              <a:rPr lang="en-GB" dirty="0"/>
+              <a:t>K. </a:t>
+            </a:r>
+            <a:r>
+              <a:rPr lang="en-GB" b="1" dirty="0" err="1">
+                <a:solidFill>
+                  <a:schemeClr val="accent2">
+                    <a:lumMod val="50000"/>
+                  </a:schemeClr>
+                </a:solidFill>
+              </a:rPr>
+              <a:t>Simonyan</a:t>
+            </a:r>
+            <a:r>
+              <a:rPr lang="en-GB" dirty="0"/>
+              <a:t> and A. </a:t>
+            </a:r>
+            <a:r>
+              <a:rPr lang="en-GB" b="1" dirty="0">
+                <a:solidFill>
+                  <a:schemeClr val="accent2">
+                    <a:lumMod val="50000"/>
+                  </a:schemeClr>
+                </a:solidFill>
+              </a:rPr>
+              <a:t>Zisserman</a:t>
+            </a:r>
+            <a:r>
+              <a:rPr lang="en-GB" dirty="0"/>
+              <a:t> “Very Deep Convolutional Networks for Large-Scale Image Recognition”, 2014.</a:t>
+            </a:r>
+          </a:p>
+          <a:p>
+            <a:r>
+              <a:rPr lang="en-GB" dirty="0"/>
+              <a:t>[He2015] K. </a:t>
+            </a:r>
+            <a:r>
+              <a:rPr lang="en-GB" b="1" dirty="0">
+                <a:solidFill>
+                  <a:schemeClr val="accent2">
+                    <a:lumMod val="50000"/>
+                  </a:schemeClr>
+                </a:solidFill>
+              </a:rPr>
+              <a:t>He</a:t>
+            </a:r>
+            <a:r>
+              <a:rPr lang="en-GB" dirty="0"/>
+              <a:t>, X. Zhang, S. </a:t>
+            </a:r>
+            <a:r>
+              <a:rPr lang="en-GB" b="1" dirty="0">
+                <a:solidFill>
+                  <a:schemeClr val="accent2">
+                    <a:lumMod val="50000"/>
+                  </a:schemeClr>
+                </a:solidFill>
+              </a:rPr>
+              <a:t>Ren</a:t>
+            </a:r>
+            <a:r>
+              <a:rPr lang="en-GB" dirty="0"/>
+              <a:t>, and J. </a:t>
+            </a:r>
+            <a:r>
+              <a:rPr lang="en-GB" b="1" dirty="0">
+                <a:solidFill>
+                  <a:schemeClr val="accent2">
+                    <a:lumMod val="50000"/>
+                  </a:schemeClr>
+                </a:solidFill>
+              </a:rPr>
+              <a:t>Sun</a:t>
+            </a:r>
+            <a:r>
+              <a:rPr lang="en-GB" dirty="0"/>
+              <a:t> “Deep Residual Learning for Image Recognition”, 2015.</a:t>
             </a:r>
           </a:p>
           <a:p>
@@ -23015,7 +23127,7 @@
     </p:spTree>
     <p:extLst>
       <p:ext uri="{BB962C8B-B14F-4D97-AF65-F5344CB8AC3E}">
-        <p14:creationId xmlns:p14="http://schemas.microsoft.com/office/powerpoint/2010/main" val="2400758646"/>
+        <p14:creationId xmlns:p14="http://schemas.microsoft.com/office/powerpoint/2010/main" val="1782110643"/>
       </p:ext>
     </p:extLst>
   </p:cSld>
@@ -23047,7 +23159,7 @@
           <p:cNvPr id="2" name="Title 1">
             <a:extLst>
               <a:ext uri="{FF2B5EF4-FFF2-40B4-BE49-F238E27FC236}">
-                <a16:creationId xmlns:a16="http://schemas.microsoft.com/office/drawing/2014/main" id="{01BA4A12-42C1-4189-603A-5E1F4771759C}"/>
+                <a16:creationId xmlns:a16="http://schemas.microsoft.com/office/drawing/2014/main" id="{F6E33F64-ACBF-414C-8E71-06E4F9517B15}"/>
               </a:ext>
             </a:extLst>
           </p:cNvPr>
@@ -23064,10 +23176,10 @@
           <a:lstStyle/>
           <a:p>
             <a:r>
-              <a:rPr lang="en-GB" dirty="0"/>
+              <a:rPr lang="en-US" dirty="0"/>
               <a:t>Learn more about these topics</a:t>
             </a:r>
-            <a:endParaRPr lang="en-SG" dirty="0"/>
+            <a:endParaRPr lang="en-GB" dirty="0"/>
           </a:p>
         </p:txBody>
       </p:sp>
@@ -23076,7 +23188,7 @@
           <p:cNvPr id="3" name="Content Placeholder 2">
             <a:extLst>
               <a:ext uri="{FF2B5EF4-FFF2-40B4-BE49-F238E27FC236}">
-                <a16:creationId xmlns:a16="http://schemas.microsoft.com/office/drawing/2014/main" id="{E475B357-0886-EDDA-5F55-77F580FB4D9B}"/>
+                <a16:creationId xmlns:a16="http://schemas.microsoft.com/office/drawing/2014/main" id="{C71C8DD6-14D1-44DF-9843-EFEDF44E39A2}"/>
               </a:ext>
             </a:extLst>
           </p:cNvPr>
@@ -23090,7 +23202,7 @@
         <p:spPr>
           <a:xfrm>
             <a:off x="838200" y="1825624"/>
-            <a:ext cx="10515600" cy="5032375"/>
+            <a:ext cx="10916138" cy="5032375"/>
           </a:xfrm>
         </p:spPr>
         <p:txBody>
@@ -23104,127 +23216,47 @@
             </a:pPr>
             <a:r>
               <a:rPr lang="en-US" dirty="0"/>
-              <a:t>Tracking important names (Track their works and follow them on Scholar, Twitter, or whatever works for you!)</a:t>
-            </a:r>
-          </a:p>
-          <a:p>
-            <a:r>
-              <a:rPr lang="en-GB" b="1" dirty="0"/>
-              <a:t>Karen </a:t>
-            </a:r>
-            <a:r>
-              <a:rPr lang="en-GB" b="1" dirty="0" err="1">
+              <a:t>Out of class, supporting papers, for those of you who are curious.</a:t>
+            </a:r>
+          </a:p>
+          <a:p>
+            <a:r>
+              <a:rPr lang="en-SG" dirty="0"/>
+              <a:t>[Huang2016] G. Huang, Z. Liu, L. van der </a:t>
+            </a:r>
+            <a:r>
+              <a:rPr lang="en-SG" dirty="0" err="1"/>
+              <a:t>Maaten</a:t>
+            </a:r>
+            <a:r>
+              <a:rPr lang="en-SG" dirty="0"/>
+              <a:t>, K. Q. Weinberger, “Densely Connected Convolutional Networks”, 2016.</a:t>
+            </a:r>
+          </a:p>
+          <a:p>
+            <a:r>
+              <a:rPr lang="en-SG" dirty="0"/>
+              <a:t>[Szegedy2014] C. </a:t>
+            </a:r>
+            <a:r>
+              <a:rPr lang="en-SG" b="1" dirty="0" err="1">
                 <a:solidFill>
                   <a:schemeClr val="accent2">
                     <a:lumMod val="50000"/>
                   </a:schemeClr>
                 </a:solidFill>
               </a:rPr>
-              <a:t>Simonyan</a:t>
-            </a:r>
-            <a:r>
-              <a:rPr lang="en-GB" b="1" dirty="0"/>
-              <a:t>: </a:t>
-            </a:r>
-            <a:r>
-              <a:rPr lang="en-GB" b="1" dirty="0" err="1"/>
-              <a:t>Fromer</a:t>
-            </a:r>
-            <a:r>
-              <a:rPr lang="en-GB" b="1" dirty="0"/>
-              <a:t> researcher</a:t>
-            </a:r>
-            <a:r>
-              <a:rPr lang="en-GB" dirty="0"/>
-              <a:t> at </a:t>
-            </a:r>
-            <a:r>
-              <a:rPr lang="en-GB" b="1" dirty="0"/>
-              <a:t>Facebook</a:t>
-            </a:r>
-            <a:r>
-              <a:rPr lang="en-GB" dirty="0"/>
-              <a:t> </a:t>
-            </a:r>
-            <a:r>
-              <a:rPr lang="en-GB" b="1" dirty="0"/>
-              <a:t>AI, </a:t>
-            </a:r>
-            <a:r>
-              <a:rPr lang="en-GB" dirty="0"/>
-              <a:t>now</a:t>
-            </a:r>
-            <a:r>
-              <a:rPr lang="en-GB" b="1" dirty="0"/>
-              <a:t> Co-Founder</a:t>
-            </a:r>
-            <a:r>
-              <a:rPr lang="en-GB" dirty="0"/>
-              <a:t> and </a:t>
-            </a:r>
-            <a:r>
-              <a:rPr lang="en-GB" b="1" dirty="0"/>
-              <a:t>Chief</a:t>
-            </a:r>
-            <a:r>
-              <a:rPr lang="en-GB" dirty="0"/>
-              <a:t> </a:t>
-            </a:r>
-            <a:r>
-              <a:rPr lang="en-GB" b="1" dirty="0"/>
-              <a:t>Scientist</a:t>
-            </a:r>
-            <a:r>
-              <a:rPr lang="en-GB" dirty="0"/>
-              <a:t> at </a:t>
-            </a:r>
-            <a:r>
-              <a:rPr lang="en-GB" b="1" dirty="0"/>
-              <a:t>Inflection</a:t>
-            </a:r>
-            <a:r>
-              <a:rPr lang="en-GB" dirty="0"/>
-              <a:t> </a:t>
-            </a:r>
-            <a:r>
-              <a:rPr lang="en-GB" b="1" dirty="0"/>
-              <a:t>AI</a:t>
-            </a:r>
-            <a:r>
-              <a:rPr lang="en-GB" dirty="0"/>
-              <a:t>.</a:t>
-            </a:r>
-            <a:br>
-              <a:rPr lang="en-GB" dirty="0"/>
-            </a:br>
-            <a:r>
-              <a:rPr lang="en-GB" dirty="0">
-                <a:hlinkClick r:id="rId2"/>
-              </a:rPr>
-              <a:t>https://scholar.google.com/citations?user=L7lMQkQAAAAJ&amp;hl=fr</a:t>
-            </a:r>
-            <a:br>
-              <a:rPr lang="en-GB" dirty="0"/>
-            </a:br>
-            <a:r>
-              <a:rPr lang="en-GB" dirty="0">
-                <a:hlinkClick r:id="rId3"/>
-              </a:rPr>
-              <a:t>https://www.robots.ox.ac.uk/~karen/</a:t>
-            </a:r>
-            <a:r>
-              <a:rPr lang="en-GB" dirty="0"/>
-              <a:t> </a:t>
-            </a:r>
-          </a:p>
-          <a:p>
-            <a:r>
-              <a:rPr lang="en-GB" b="1" dirty="0"/>
-              <a:t>Andrew</a:t>
-            </a:r>
-            <a:r>
-              <a:rPr lang="en-GB" dirty="0"/>
-              <a:t> </a:t>
+              <a:t>Szegedy</a:t>
+            </a:r>
+            <a:r>
+              <a:rPr lang="en-SG" dirty="0"/>
+              <a:t> et al., “Going deeper with convolutions”, 2014.</a:t>
+            </a:r>
+          </a:p>
+          <a:p>
+            <a:r>
+              <a:rPr lang="en-GB" dirty="0"/>
+              <a:t>[Tan2019] M. Tan and Q. V. </a:t>
             </a:r>
             <a:r>
               <a:rPr lang="en-GB" b="1" dirty="0">
@@ -23234,110 +23266,47 @@
                   </a:schemeClr>
                 </a:solidFill>
               </a:rPr>
-              <a:t>Zisserman</a:t>
-            </a:r>
-            <a:r>
-              <a:rPr lang="en-GB" b="1" dirty="0"/>
-              <a:t>:</a:t>
-            </a:r>
-            <a:r>
-              <a:rPr lang="en-GB" dirty="0"/>
-              <a:t> </a:t>
-            </a:r>
-            <a:r>
-              <a:rPr lang="en-GB" b="1" dirty="0"/>
-              <a:t>Professor</a:t>
-            </a:r>
-            <a:r>
-              <a:rPr lang="en-GB" dirty="0"/>
-              <a:t> at the </a:t>
-            </a:r>
-            <a:r>
-              <a:rPr lang="en-GB" b="1" dirty="0"/>
-              <a:t>University</a:t>
-            </a:r>
-            <a:r>
-              <a:rPr lang="en-GB" dirty="0"/>
-              <a:t> </a:t>
-            </a:r>
-            <a:r>
-              <a:rPr lang="en-GB" b="1" dirty="0"/>
-              <a:t>of</a:t>
-            </a:r>
-            <a:r>
-              <a:rPr lang="en-GB" dirty="0"/>
-              <a:t> </a:t>
-            </a:r>
-            <a:r>
-              <a:rPr lang="en-GB" b="1" dirty="0"/>
-              <a:t>Oxford</a:t>
-            </a:r>
-            <a:r>
-              <a:rPr lang="en-GB" dirty="0"/>
-              <a:t> and </a:t>
-            </a:r>
-            <a:r>
-              <a:rPr lang="en-GB" b="1" dirty="0"/>
-              <a:t>Principal</a:t>
-            </a:r>
-            <a:r>
-              <a:rPr lang="en-GB" dirty="0"/>
-              <a:t> </a:t>
-            </a:r>
-            <a:r>
-              <a:rPr lang="en-GB" b="1" dirty="0"/>
-              <a:t>Researcher</a:t>
-            </a:r>
-            <a:r>
-              <a:rPr lang="en-GB" dirty="0"/>
-              <a:t> at </a:t>
-            </a:r>
-            <a:r>
-              <a:rPr lang="en-GB" b="1" dirty="0">
-                <a:solidFill>
-                  <a:schemeClr val="accent2">
-                    <a:lumMod val="50000"/>
-                  </a:schemeClr>
-                </a:solidFill>
-              </a:rPr>
-              <a:t>DeepMind</a:t>
-            </a:r>
-            <a:r>
-              <a:rPr lang="en-GB" dirty="0"/>
-              <a:t>.</a:t>
-            </a:r>
-            <a:br>
-              <a:rPr lang="en-GB" dirty="0"/>
-            </a:br>
-            <a:r>
-              <a:rPr lang="en-GB" dirty="0">
-                <a:hlinkClick r:id="rId4"/>
-              </a:rPr>
-              <a:t>https://scholar.google.com/citations?user=UZ5wscMAAAAJ&amp;hl=en</a:t>
-            </a:r>
-            <a:br>
-              <a:rPr lang="en-GB" dirty="0"/>
-            </a:br>
-            <a:r>
-              <a:rPr lang="en-GB" dirty="0">
-                <a:hlinkClick r:id="rId5"/>
-              </a:rPr>
-              <a:t>https://www.robots.ox.ac.uk/~az/</a:t>
-            </a:r>
-            <a:r>
-              <a:rPr lang="en-GB" dirty="0"/>
-              <a:t> </a:t>
-            </a:r>
-          </a:p>
-          <a:p>
-            <a:endParaRPr lang="en-SG" dirty="0"/>
+              <a:t>Le</a:t>
+            </a:r>
+            <a:r>
+              <a:rPr lang="en-GB" dirty="0"/>
+              <a:t>, “</a:t>
+            </a:r>
+            <a:r>
+              <a:rPr lang="en-GB" dirty="0" err="1"/>
+              <a:t>EfficientNet</a:t>
+            </a:r>
+            <a:r>
+              <a:rPr lang="en-GB" dirty="0"/>
+              <a:t>: Rethinking Model Scaling for Convolutional Neural Networks”, 2019.</a:t>
+            </a:r>
+          </a:p>
+          <a:p>
+            <a:r>
+              <a:rPr lang="en-GB" dirty="0"/>
+              <a:t>[Yosinski2014] J. </a:t>
+            </a:r>
+            <a:r>
+              <a:rPr lang="en-GB" dirty="0" err="1"/>
+              <a:t>Yosinski</a:t>
+            </a:r>
+            <a:r>
+              <a:rPr lang="en-GB" dirty="0"/>
+              <a:t> et al., “How transferable are features in deep neural networks?” 2014.</a:t>
+            </a:r>
+          </a:p>
+          <a:p>
+            <a:endParaRPr lang="en-GB" dirty="0"/>
+          </a:p>
+          <a:p>
+            <a:endParaRPr lang="en-GB" dirty="0"/>
           </a:p>
         </p:txBody>
       </p:sp>
     </p:spTree>
     <p:extLst>
       <p:ext uri="{BB962C8B-B14F-4D97-AF65-F5344CB8AC3E}">
-        <p14:creationId xmlns:p14="http://schemas.microsoft.com/office/powerpoint/2010/main" val="2337881207"/>
+        <p14:creationId xmlns:p14="http://schemas.microsoft.com/office/powerpoint/2010/main" val="2400758646"/>
       </p:ext>
     </p:extLst>
   </p:cSld>
@@ -23571,6 +23540,328 @@
         <p:spPr>
           <a:xfrm>
             <a:off x="838200" y="1825624"/>
+            <a:ext cx="10515600" cy="5032375"/>
+          </a:xfrm>
+        </p:spPr>
+        <p:txBody>
+          <a:bodyPr>
+            <a:normAutofit/>
+          </a:bodyPr>
+          <a:lstStyle/>
+          <a:p>
+            <a:pPr marL="0" indent="0">
+              <a:buNone/>
+            </a:pPr>
+            <a:r>
+              <a:rPr lang="en-US" dirty="0"/>
+              <a:t>Tracking important names (Track their works and follow them on Scholar, Twitter, or whatever works for you!)</a:t>
+            </a:r>
+          </a:p>
+          <a:p>
+            <a:r>
+              <a:rPr lang="en-GB" b="1" dirty="0"/>
+              <a:t>Karen </a:t>
+            </a:r>
+            <a:r>
+              <a:rPr lang="en-GB" b="1" dirty="0" err="1">
+                <a:solidFill>
+                  <a:schemeClr val="accent2">
+                    <a:lumMod val="50000"/>
+                  </a:schemeClr>
+                </a:solidFill>
+              </a:rPr>
+              <a:t>Simonyan</a:t>
+            </a:r>
+            <a:r>
+              <a:rPr lang="en-GB" b="1" dirty="0"/>
+              <a:t>: </a:t>
+            </a:r>
+            <a:r>
+              <a:rPr lang="en-GB" b="1" dirty="0" err="1"/>
+              <a:t>Fromer</a:t>
+            </a:r>
+            <a:r>
+              <a:rPr lang="en-GB" b="1" dirty="0"/>
+              <a:t> researcher</a:t>
+            </a:r>
+            <a:r>
+              <a:rPr lang="en-GB" dirty="0"/>
+              <a:t> at </a:t>
+            </a:r>
+            <a:r>
+              <a:rPr lang="en-GB" b="1" dirty="0"/>
+              <a:t>Facebook</a:t>
+            </a:r>
+            <a:r>
+              <a:rPr lang="en-GB" dirty="0"/>
+              <a:t> </a:t>
+            </a:r>
+            <a:r>
+              <a:rPr lang="en-GB" b="1" dirty="0"/>
+              <a:t>AI, </a:t>
+            </a:r>
+            <a:r>
+              <a:rPr lang="en-GB" dirty="0"/>
+              <a:t>now</a:t>
+            </a:r>
+            <a:r>
+              <a:rPr lang="en-GB" b="1" dirty="0"/>
+              <a:t> Co-Founder</a:t>
+            </a:r>
+            <a:r>
+              <a:rPr lang="en-GB" dirty="0"/>
+              <a:t> and </a:t>
+            </a:r>
+            <a:r>
+              <a:rPr lang="en-GB" b="1" dirty="0"/>
+              <a:t>Chief</a:t>
+            </a:r>
+            <a:r>
+              <a:rPr lang="en-GB" dirty="0"/>
+              <a:t> </a:t>
+            </a:r>
+            <a:r>
+              <a:rPr lang="en-GB" b="1" dirty="0"/>
+              <a:t>Scientist</a:t>
+            </a:r>
+            <a:r>
+              <a:rPr lang="en-GB" dirty="0"/>
+              <a:t> at </a:t>
+            </a:r>
+            <a:r>
+              <a:rPr lang="en-GB" b="1" dirty="0"/>
+              <a:t>Inflection</a:t>
+            </a:r>
+            <a:r>
+              <a:rPr lang="en-GB" dirty="0"/>
+              <a:t> </a:t>
+            </a:r>
+            <a:r>
+              <a:rPr lang="en-GB" b="1" dirty="0"/>
+              <a:t>AI</a:t>
+            </a:r>
+            <a:r>
+              <a:rPr lang="en-GB" dirty="0"/>
+              <a:t>.</a:t>
+            </a:r>
+            <a:br>
+              <a:rPr lang="en-GB" dirty="0"/>
+            </a:br>
+            <a:r>
+              <a:rPr lang="en-GB" dirty="0">
+                <a:hlinkClick r:id="rId2"/>
+              </a:rPr>
+              <a:t>https://scholar.google.com/citations?user=L7lMQkQAAAAJ&amp;hl=fr</a:t>
+            </a:r>
+            <a:br>
+              <a:rPr lang="en-GB" dirty="0"/>
+            </a:br>
+            <a:r>
+              <a:rPr lang="en-GB" dirty="0">
+                <a:hlinkClick r:id="rId3"/>
+              </a:rPr>
+              <a:t>https://www.robots.ox.ac.uk/~karen/</a:t>
+            </a:r>
+            <a:r>
+              <a:rPr lang="en-GB" dirty="0"/>
+              <a:t> </a:t>
+            </a:r>
+          </a:p>
+          <a:p>
+            <a:r>
+              <a:rPr lang="en-GB" b="1" dirty="0"/>
+              <a:t>Andrew</a:t>
+            </a:r>
+            <a:r>
+              <a:rPr lang="en-GB" dirty="0"/>
+              <a:t> </a:t>
+            </a:r>
+            <a:r>
+              <a:rPr lang="en-GB" b="1" dirty="0">
+                <a:solidFill>
+                  <a:schemeClr val="accent2">
+                    <a:lumMod val="50000"/>
+                  </a:schemeClr>
+                </a:solidFill>
+              </a:rPr>
+              <a:t>Zisserman</a:t>
+            </a:r>
+            <a:r>
+              <a:rPr lang="en-GB" b="1" dirty="0"/>
+              <a:t>:</a:t>
+            </a:r>
+            <a:r>
+              <a:rPr lang="en-GB" dirty="0"/>
+              <a:t> </a:t>
+            </a:r>
+            <a:r>
+              <a:rPr lang="en-GB" b="1" dirty="0"/>
+              <a:t>Professor</a:t>
+            </a:r>
+            <a:r>
+              <a:rPr lang="en-GB" dirty="0"/>
+              <a:t> at the </a:t>
+            </a:r>
+            <a:r>
+              <a:rPr lang="en-GB" b="1" dirty="0"/>
+              <a:t>University</a:t>
+            </a:r>
+            <a:r>
+              <a:rPr lang="en-GB" dirty="0"/>
+              <a:t> </a:t>
+            </a:r>
+            <a:r>
+              <a:rPr lang="en-GB" b="1" dirty="0"/>
+              <a:t>of</a:t>
+            </a:r>
+            <a:r>
+              <a:rPr lang="en-GB" dirty="0"/>
+              <a:t> </a:t>
+            </a:r>
+            <a:r>
+              <a:rPr lang="en-GB" b="1" dirty="0"/>
+              <a:t>Oxford</a:t>
+            </a:r>
+            <a:r>
+              <a:rPr lang="en-GB" dirty="0"/>
+              <a:t> and </a:t>
+            </a:r>
+            <a:r>
+              <a:rPr lang="en-GB" b="1" dirty="0"/>
+              <a:t>Principal</a:t>
+            </a:r>
+            <a:r>
+              <a:rPr lang="en-GB" dirty="0"/>
+              <a:t> </a:t>
+            </a:r>
+            <a:r>
+              <a:rPr lang="en-GB" b="1" dirty="0"/>
+              <a:t>Researcher</a:t>
+            </a:r>
+            <a:r>
+              <a:rPr lang="en-GB" dirty="0"/>
+              <a:t> at </a:t>
+            </a:r>
+            <a:r>
+              <a:rPr lang="en-GB" b="1" dirty="0">
+                <a:solidFill>
+                  <a:schemeClr val="accent2">
+                    <a:lumMod val="50000"/>
+                  </a:schemeClr>
+                </a:solidFill>
+              </a:rPr>
+              <a:t>DeepMind</a:t>
+            </a:r>
+            <a:r>
+              <a:rPr lang="en-GB" dirty="0"/>
+              <a:t>.</a:t>
+            </a:r>
+            <a:br>
+              <a:rPr lang="en-GB" dirty="0"/>
+            </a:br>
+            <a:r>
+              <a:rPr lang="en-GB" dirty="0">
+                <a:hlinkClick r:id="rId4"/>
+              </a:rPr>
+              <a:t>https://scholar.google.com/citations?user=UZ5wscMAAAAJ&amp;hl=en</a:t>
+            </a:r>
+            <a:br>
+              <a:rPr lang="en-GB" dirty="0"/>
+            </a:br>
+            <a:r>
+              <a:rPr lang="en-GB" dirty="0">
+                <a:hlinkClick r:id="rId5"/>
+              </a:rPr>
+              <a:t>https://www.robots.ox.ac.uk/~az/</a:t>
+            </a:r>
+            <a:r>
+              <a:rPr lang="en-GB" dirty="0"/>
+              <a:t> </a:t>
+            </a:r>
+          </a:p>
+          <a:p>
+            <a:endParaRPr lang="en-SG" dirty="0"/>
+          </a:p>
+        </p:txBody>
+      </p:sp>
+    </p:spTree>
+    <p:extLst>
+      <p:ext uri="{BB962C8B-B14F-4D97-AF65-F5344CB8AC3E}">
+        <p14:creationId xmlns:p14="http://schemas.microsoft.com/office/powerpoint/2010/main" val="2337881207"/>
+      </p:ext>
+    </p:extLst>
+  </p:cSld>
+  <p:clrMapOvr>
+    <a:masterClrMapping/>
+  </p:clrMapOvr>
+</p:sld>
+</file>
+
+<file path=ppt/slides/slide61.xml><?xml version="1.0" encoding="utf-8"?>
+<p:sld xmlns:a="http://schemas.openxmlformats.org/drawingml/2006/main" xmlns:r="http://schemas.openxmlformats.org/officeDocument/2006/relationships" xmlns:p="http://schemas.openxmlformats.org/presentationml/2006/main">
+  <p:cSld>
+    <p:spTree>
+      <p:nvGrpSpPr>
+        <p:cNvPr id="1" name=""/>
+        <p:cNvGrpSpPr/>
+        <p:nvPr/>
+      </p:nvGrpSpPr>
+      <p:grpSpPr>
+        <a:xfrm>
+          <a:off x="0" y="0"/>
+          <a:ext cx="0" cy="0"/>
+          <a:chOff x="0" y="0"/>
+          <a:chExt cx="0" cy="0"/>
+        </a:xfrm>
+      </p:grpSpPr>
+      <p:sp>
+        <p:nvSpPr>
+          <p:cNvPr id="2" name="Title 1">
+            <a:extLst>
+              <a:ext uri="{FF2B5EF4-FFF2-40B4-BE49-F238E27FC236}">
+                <a16:creationId xmlns:a16="http://schemas.microsoft.com/office/drawing/2014/main" id="{01BA4A12-42C1-4189-603A-5E1F4771759C}"/>
+              </a:ext>
+            </a:extLst>
+          </p:cNvPr>
+          <p:cNvSpPr>
+            <a:spLocks noGrp="1"/>
+          </p:cNvSpPr>
+          <p:nvPr>
+            <p:ph type="title"/>
+          </p:nvPr>
+        </p:nvSpPr>
+        <p:spPr/>
+        <p:txBody>
+          <a:bodyPr/>
+          <a:lstStyle/>
+          <a:p>
+            <a:r>
+              <a:rPr lang="en-GB" dirty="0"/>
+              <a:t>Learn more about these topics</a:t>
+            </a:r>
+            <a:endParaRPr lang="en-SG" dirty="0"/>
+          </a:p>
+        </p:txBody>
+      </p:sp>
+      <p:sp>
+        <p:nvSpPr>
+          <p:cNvPr id="3" name="Content Placeholder 2">
+            <a:extLst>
+              <a:ext uri="{FF2B5EF4-FFF2-40B4-BE49-F238E27FC236}">
+                <a16:creationId xmlns:a16="http://schemas.microsoft.com/office/drawing/2014/main" id="{E475B357-0886-EDDA-5F55-77F580FB4D9B}"/>
+              </a:ext>
+            </a:extLst>
+          </p:cNvPr>
+          <p:cNvSpPr>
+            <a:spLocks noGrp="1"/>
+          </p:cNvSpPr>
+          <p:nvPr>
+            <p:ph idx="1"/>
+          </p:nvPr>
+        </p:nvSpPr>
+        <p:spPr>
+          <a:xfrm>
+            <a:off x="838200" y="1825624"/>
             <a:ext cx="11049000" cy="5032375"/>
           </a:xfrm>
         </p:spPr>
@@ -23877,7 +24168,7 @@
 </p:sld>
 </file>
 
-<file path=ppt/slides/slide61.xml><?xml version="1.0" encoding="utf-8"?>
+<file path=ppt/slides/slide62.xml><?xml version="1.0" encoding="utf-8"?>
 <p:sld xmlns:a="http://schemas.openxmlformats.org/drawingml/2006/main" xmlns:r="http://schemas.openxmlformats.org/officeDocument/2006/relationships" xmlns:p="http://schemas.openxmlformats.org/presentationml/2006/main">
   <p:cSld>
     <p:spTree>

</xml_diff>